<commit_message>
Update UML diagrams and add figure numbers in developer guide
</commit_message>
<xml_diff>
--- a/docs/images/Architecture.pptx
+++ b/docs/images/Architecture.pptx
@@ -104,6 +104,11 @@
       </a:defRPr>
     </a:lvl9pPr>
   </p:defaultTextStyle>
+  <p:extLst>
+    <p:ext uri="{EFAFB233-063F-42B5-8137-9DF3F51BA10A}">
+      <p15:sldGuideLst xmlns:p15="http://schemas.microsoft.com/office/powerpoint/2012/main"/>
+    </p:ext>
+  </p:extLst>
 </p:presentation>
 </file>
 
@@ -256,7 +261,7 @@
           <a:p>
             <a:fld id="{56DACA9B-B179-4138-B221-94EE30BD2B15}" type="datetimeFigureOut">
               <a:rPr lang="en-SG" smtClean="0"/>
-              <a:t>26/10/2020</a:t>
+              <a:t>6/11/2020</a:t>
             </a:fld>
             <a:endParaRPr lang="en-SG"/>
           </a:p>
@@ -456,7 +461,7 @@
           <a:p>
             <a:fld id="{56DACA9B-B179-4138-B221-94EE30BD2B15}" type="datetimeFigureOut">
               <a:rPr lang="en-SG" smtClean="0"/>
-              <a:t>26/10/2020</a:t>
+              <a:t>6/11/2020</a:t>
             </a:fld>
             <a:endParaRPr lang="en-SG"/>
           </a:p>
@@ -666,7 +671,7 @@
           <a:p>
             <a:fld id="{56DACA9B-B179-4138-B221-94EE30BD2B15}" type="datetimeFigureOut">
               <a:rPr lang="en-SG" smtClean="0"/>
-              <a:t>26/10/2020</a:t>
+              <a:t>6/11/2020</a:t>
             </a:fld>
             <a:endParaRPr lang="en-SG"/>
           </a:p>
@@ -866,7 +871,7 @@
           <a:p>
             <a:fld id="{56DACA9B-B179-4138-B221-94EE30BD2B15}" type="datetimeFigureOut">
               <a:rPr lang="en-SG" smtClean="0"/>
-              <a:t>26/10/2020</a:t>
+              <a:t>6/11/2020</a:t>
             </a:fld>
             <a:endParaRPr lang="en-SG"/>
           </a:p>
@@ -1142,7 +1147,7 @@
           <a:p>
             <a:fld id="{56DACA9B-B179-4138-B221-94EE30BD2B15}" type="datetimeFigureOut">
               <a:rPr lang="en-SG" smtClean="0"/>
-              <a:t>26/10/2020</a:t>
+              <a:t>6/11/2020</a:t>
             </a:fld>
             <a:endParaRPr lang="en-SG"/>
           </a:p>
@@ -1410,7 +1415,7 @@
           <a:p>
             <a:fld id="{56DACA9B-B179-4138-B221-94EE30BD2B15}" type="datetimeFigureOut">
               <a:rPr lang="en-SG" smtClean="0"/>
-              <a:t>26/10/2020</a:t>
+              <a:t>6/11/2020</a:t>
             </a:fld>
             <a:endParaRPr lang="en-SG"/>
           </a:p>
@@ -1825,7 +1830,7 @@
           <a:p>
             <a:fld id="{56DACA9B-B179-4138-B221-94EE30BD2B15}" type="datetimeFigureOut">
               <a:rPr lang="en-SG" smtClean="0"/>
-              <a:t>26/10/2020</a:t>
+              <a:t>6/11/2020</a:t>
             </a:fld>
             <a:endParaRPr lang="en-SG"/>
           </a:p>
@@ -1967,7 +1972,7 @@
           <a:p>
             <a:fld id="{56DACA9B-B179-4138-B221-94EE30BD2B15}" type="datetimeFigureOut">
               <a:rPr lang="en-SG" smtClean="0"/>
-              <a:t>26/10/2020</a:t>
+              <a:t>6/11/2020</a:t>
             </a:fld>
             <a:endParaRPr lang="en-SG"/>
           </a:p>
@@ -2080,7 +2085,7 @@
           <a:p>
             <a:fld id="{56DACA9B-B179-4138-B221-94EE30BD2B15}" type="datetimeFigureOut">
               <a:rPr lang="en-SG" smtClean="0"/>
-              <a:t>26/10/2020</a:t>
+              <a:t>6/11/2020</a:t>
             </a:fld>
             <a:endParaRPr lang="en-SG"/>
           </a:p>
@@ -2393,7 +2398,7 @@
           <a:p>
             <a:fld id="{56DACA9B-B179-4138-B221-94EE30BD2B15}" type="datetimeFigureOut">
               <a:rPr lang="en-SG" smtClean="0"/>
-              <a:t>26/10/2020</a:t>
+              <a:t>6/11/2020</a:t>
             </a:fld>
             <a:endParaRPr lang="en-SG"/>
           </a:p>
@@ -2682,7 +2687,7 @@
           <a:p>
             <a:fld id="{56DACA9B-B179-4138-B221-94EE30BD2B15}" type="datetimeFigureOut">
               <a:rPr lang="en-SG" smtClean="0"/>
-              <a:t>26/10/2020</a:t>
+              <a:t>6/11/2020</a:t>
             </a:fld>
             <a:endParaRPr lang="en-SG"/>
           </a:p>
@@ -2925,7 +2930,7 @@
           <a:p>
             <a:fld id="{56DACA9B-B179-4138-B221-94EE30BD2B15}" type="datetimeFigureOut">
               <a:rPr lang="en-SG" smtClean="0"/>
-              <a:t>26/10/2020</a:t>
+              <a:t>6/11/2020</a:t>
             </a:fld>
             <a:endParaRPr lang="en-SG"/>
           </a:p>
@@ -4032,8 +4037,8 @@
         </p:nvSpPr>
         <p:spPr>
           <a:xfrm flipH="1">
-            <a:off x="2877608" y="4820377"/>
-            <a:ext cx="778931" cy="570908"/>
+            <a:off x="2944282" y="4753701"/>
+            <a:ext cx="999067" cy="817379"/>
           </a:xfrm>
           <a:prstGeom prst="roundRect">
             <a:avLst/>
@@ -4100,8 +4105,8 @@
         </p:nvCxnSpPr>
         <p:spPr>
           <a:xfrm flipV="1">
-            <a:off x="3267073" y="4147045"/>
-            <a:ext cx="1" cy="673332"/>
+            <a:off x="3443815" y="3966275"/>
+            <a:ext cx="0" cy="787426"/>
           </a:xfrm>
           <a:prstGeom prst="straightConnector1">
             <a:avLst/>
@@ -4145,8 +4150,8 @@
         </p:nvCxnSpPr>
         <p:spPr>
           <a:xfrm>
-            <a:off x="3656539" y="5125312"/>
-            <a:ext cx="497432" cy="0"/>
+            <a:off x="3943349" y="5286215"/>
+            <a:ext cx="1209676" cy="0"/>
           </a:xfrm>
           <a:prstGeom prst="straightConnector1">
             <a:avLst/>
@@ -4189,9 +4194,9 @@
           <p:nvPr/>
         </p:nvCxnSpPr>
         <p:spPr>
-          <a:xfrm>
-            <a:off x="3267073" y="5372800"/>
-            <a:ext cx="886898" cy="713378"/>
+          <a:xfrm flipV="1">
+            <a:off x="3914245" y="4281892"/>
+            <a:ext cx="1091140" cy="697830"/>
           </a:xfrm>
           <a:prstGeom prst="straightConnector1">
             <a:avLst/>

</xml_diff>